<commit_message>
Update PPT for CTP 6
if => when in Exception Filters
</commit_message>
<xml_diff>
--- a/TourOfC#6.pptx
+++ b/TourOfC#6.pptx
@@ -5,10 +5,10 @@
     <p:sldMasterId id="2147483648" r:id="rId2"/>
   </p:sldMasterIdLst>
   <p:notesMasterIdLst>
-    <p:notesMasterId r:id="rId22"/>
+    <p:notesMasterId r:id="rId21"/>
   </p:notesMasterIdLst>
   <p:handoutMasterIdLst>
-    <p:handoutMasterId r:id="rId23"/>
+    <p:handoutMasterId r:id="rId22"/>
   </p:handoutMasterIdLst>
   <p:sldIdLst>
     <p:sldId id="256" r:id="rId3"/>
@@ -24,12 +24,11 @@
     <p:sldId id="282" r:id="rId13"/>
     <p:sldId id="296" r:id="rId14"/>
     <p:sldId id="283" r:id="rId15"/>
-    <p:sldId id="297" r:id="rId16"/>
-    <p:sldId id="279" r:id="rId17"/>
-    <p:sldId id="280" r:id="rId18"/>
-    <p:sldId id="271" r:id="rId19"/>
-    <p:sldId id="269" r:id="rId20"/>
-    <p:sldId id="274" r:id="rId21"/>
+    <p:sldId id="279" r:id="rId16"/>
+    <p:sldId id="280" r:id="rId17"/>
+    <p:sldId id="271" r:id="rId18"/>
+    <p:sldId id="269" r:id="rId19"/>
+    <p:sldId id="274" r:id="rId20"/>
   </p:sldIdLst>
   <p:sldSz cx="12188825" cy="6858000"/>
   <p:notesSz cx="6858000" cy="9144000"/>
@@ -1449,21 +1448,21 @@
     </dgm:pt>
   </dgm:ptLst>
   <dgm:cxnLst>
+    <dgm:cxn modelId="{B0853F4E-0D10-4453-BA0F-87D700E6FDEE}" type="presOf" srcId="{7E2B8B4E-293F-43EE-AB7D-6598814ECB3C}" destId="{B3F8C3C3-65FB-486F-82C0-A8478B7022B9}" srcOrd="0" destOrd="0" presId="urn:microsoft.com/office/officeart/2005/8/layout/radial6"/>
+    <dgm:cxn modelId="{D34E2ED8-ECCD-4FDF-AE76-C792B052F77C}" type="presOf" srcId="{5C1F42F6-070E-4EBA-8EBC-C32D27C49363}" destId="{22CB3940-637A-4C32-AB7F-CFAD929A59AB}" srcOrd="0" destOrd="0" presId="urn:microsoft.com/office/officeart/2005/8/layout/radial6"/>
+    <dgm:cxn modelId="{63BD5587-3071-4797-BB80-7C21100AAD79}" type="presOf" srcId="{03860152-2A6F-476F-91FD-CBA9D7B26338}" destId="{FADEA337-AD34-4422-B53A-01423AF1AC8F}" srcOrd="0" destOrd="0" presId="urn:microsoft.com/office/officeart/2005/8/layout/radial6"/>
+    <dgm:cxn modelId="{18D120E8-5826-42E7-A890-F4AFB63D3D78}" srcId="{AA38CBC9-AC6B-457D-9F63-4D1AB8E7793E}" destId="{7E2B8B4E-293F-43EE-AB7D-6598814ECB3C}" srcOrd="3" destOrd="0" parTransId="{C9A52CF1-B2E8-4848-8964-6633294F16CC}" sibTransId="{03860152-2A6F-476F-91FD-CBA9D7B26338}"/>
+    <dgm:cxn modelId="{50E3B5F1-6595-4ED9-B849-AA5F6C21B078}" type="presOf" srcId="{AA38CBC9-AC6B-457D-9F63-4D1AB8E7793E}" destId="{D2BB9C9C-582A-4226-99A2-A6A4B7AD887A}" srcOrd="0" destOrd="0" presId="urn:microsoft.com/office/officeart/2005/8/layout/radial6"/>
+    <dgm:cxn modelId="{213B572F-3D42-4865-8468-2B23B55DDDF6}" type="presOf" srcId="{775D1C29-7B88-46A3-9FAD-95EFDC006E81}" destId="{65DE7562-7D1C-4B0F-8927-12F8E6C5F5AF}" srcOrd="0" destOrd="0" presId="urn:microsoft.com/office/officeart/2005/8/layout/radial6"/>
+    <dgm:cxn modelId="{5F25D665-3021-461A-AA8B-FC4CA49A8593}" type="presOf" srcId="{87E6D3C0-9C36-4C9B-9EE4-FCB2F172CF62}" destId="{1C226D9E-C8BD-43C0-B5A7-66592C02513E}" srcOrd="0" destOrd="0" presId="urn:microsoft.com/office/officeart/2005/8/layout/radial6"/>
+    <dgm:cxn modelId="{3E929F04-D66A-4ADD-A218-BA7B4D2C65EC}" type="presOf" srcId="{B04B74A7-039D-46F2-A30E-0D07E04CAE1A}" destId="{53B5DF5F-8B8B-41EF-8531-276CBECDCAB4}" srcOrd="0" destOrd="0" presId="urn:microsoft.com/office/officeart/2005/8/layout/radial6"/>
+    <dgm:cxn modelId="{9F2E5EDD-E3E4-45F7-937A-24FDB14700F0}" type="presOf" srcId="{50789F86-D3CE-4C0B-B830-60161BD38E85}" destId="{0B9D5D8D-AE9B-4E3C-8081-7E5A4C702F02}" srcOrd="0" destOrd="0" presId="urn:microsoft.com/office/officeart/2005/8/layout/radial6"/>
+    <dgm:cxn modelId="{FBE6BCEA-0F85-486D-B532-D55CCA25A01D}" srcId="{AA38CBC9-AC6B-457D-9F63-4D1AB8E7793E}" destId="{20EB584B-A7B7-43D9-BF6A-2C9338C05B4D}" srcOrd="2" destOrd="0" parTransId="{6E0D28F6-A05C-413F-A991-03D9F094F998}" sibTransId="{B04B74A7-039D-46F2-A30E-0D07E04CAE1A}"/>
+    <dgm:cxn modelId="{1593062C-A63F-4042-94C9-FF0880BD82E8}" srcId="{AA38CBC9-AC6B-457D-9F63-4D1AB8E7793E}" destId="{50789F86-D3CE-4C0B-B830-60161BD38E85}" srcOrd="0" destOrd="0" parTransId="{6D6B568F-9C4B-44DB-A886-035491FEC9C2}" sibTransId="{775D1C29-7B88-46A3-9FAD-95EFDC006E81}"/>
+    <dgm:cxn modelId="{F68BA8B4-E5E5-4A12-9338-5CF5693ADCA2}" srcId="{B8060F7B-9920-4F24-BE71-F0E4E3B7B934}" destId="{AA38CBC9-AC6B-457D-9F63-4D1AB8E7793E}" srcOrd="0" destOrd="0" parTransId="{02DFC051-974F-4AF1-85DB-FFF5F1CCD57A}" sibTransId="{7ACF197E-8A7D-4D14-A941-EE15BE87306C}"/>
+    <dgm:cxn modelId="{EB3E6C57-F560-450F-B619-F6F67905927D}" srcId="{AA38CBC9-AC6B-457D-9F63-4D1AB8E7793E}" destId="{87E6D3C0-9C36-4C9B-9EE4-FCB2F172CF62}" srcOrd="1" destOrd="0" parTransId="{1916856A-C084-48E2-AF18-70269AD79DF2}" sibTransId="{5C1F42F6-070E-4EBA-8EBC-C32D27C49363}"/>
     <dgm:cxn modelId="{66D10D89-90C6-4D3D-B022-615F34E0F6A8}" type="presOf" srcId="{B8060F7B-9920-4F24-BE71-F0E4E3B7B934}" destId="{B0C37B97-914B-49F2-84E5-94B39EF2352F}" srcOrd="0" destOrd="0" presId="urn:microsoft.com/office/officeart/2005/8/layout/radial6"/>
-    <dgm:cxn modelId="{EB3E6C57-F560-450F-B619-F6F67905927D}" srcId="{AA38CBC9-AC6B-457D-9F63-4D1AB8E7793E}" destId="{87E6D3C0-9C36-4C9B-9EE4-FCB2F172CF62}" srcOrd="1" destOrd="0" parTransId="{1916856A-C084-48E2-AF18-70269AD79DF2}" sibTransId="{5C1F42F6-070E-4EBA-8EBC-C32D27C49363}"/>
     <dgm:cxn modelId="{487B127C-E0EE-48AC-AACB-3F827CA01E94}" type="presOf" srcId="{20EB584B-A7B7-43D9-BF6A-2C9338C05B4D}" destId="{29DFD080-5F1B-4B82-A3B2-DA9D6DF3694E}" srcOrd="0" destOrd="0" presId="urn:microsoft.com/office/officeart/2005/8/layout/radial6"/>
-    <dgm:cxn modelId="{5F25D665-3021-461A-AA8B-FC4CA49A8593}" type="presOf" srcId="{87E6D3C0-9C36-4C9B-9EE4-FCB2F172CF62}" destId="{1C226D9E-C8BD-43C0-B5A7-66592C02513E}" srcOrd="0" destOrd="0" presId="urn:microsoft.com/office/officeart/2005/8/layout/radial6"/>
-    <dgm:cxn modelId="{63BD5587-3071-4797-BB80-7C21100AAD79}" type="presOf" srcId="{03860152-2A6F-476F-91FD-CBA9D7B26338}" destId="{FADEA337-AD34-4422-B53A-01423AF1AC8F}" srcOrd="0" destOrd="0" presId="urn:microsoft.com/office/officeart/2005/8/layout/radial6"/>
-    <dgm:cxn modelId="{FBE6BCEA-0F85-486D-B532-D55CCA25A01D}" srcId="{AA38CBC9-AC6B-457D-9F63-4D1AB8E7793E}" destId="{20EB584B-A7B7-43D9-BF6A-2C9338C05B4D}" srcOrd="2" destOrd="0" parTransId="{6E0D28F6-A05C-413F-A991-03D9F094F998}" sibTransId="{B04B74A7-039D-46F2-A30E-0D07E04CAE1A}"/>
-    <dgm:cxn modelId="{213B572F-3D42-4865-8468-2B23B55DDDF6}" type="presOf" srcId="{775D1C29-7B88-46A3-9FAD-95EFDC006E81}" destId="{65DE7562-7D1C-4B0F-8927-12F8E6C5F5AF}" srcOrd="0" destOrd="0" presId="urn:microsoft.com/office/officeart/2005/8/layout/radial6"/>
-    <dgm:cxn modelId="{50E3B5F1-6595-4ED9-B849-AA5F6C21B078}" type="presOf" srcId="{AA38CBC9-AC6B-457D-9F63-4D1AB8E7793E}" destId="{D2BB9C9C-582A-4226-99A2-A6A4B7AD887A}" srcOrd="0" destOrd="0" presId="urn:microsoft.com/office/officeart/2005/8/layout/radial6"/>
-    <dgm:cxn modelId="{9F2E5EDD-E3E4-45F7-937A-24FDB14700F0}" type="presOf" srcId="{50789F86-D3CE-4C0B-B830-60161BD38E85}" destId="{0B9D5D8D-AE9B-4E3C-8081-7E5A4C702F02}" srcOrd="0" destOrd="0" presId="urn:microsoft.com/office/officeart/2005/8/layout/radial6"/>
-    <dgm:cxn modelId="{1593062C-A63F-4042-94C9-FF0880BD82E8}" srcId="{AA38CBC9-AC6B-457D-9F63-4D1AB8E7793E}" destId="{50789F86-D3CE-4C0B-B830-60161BD38E85}" srcOrd="0" destOrd="0" parTransId="{6D6B568F-9C4B-44DB-A886-035491FEC9C2}" sibTransId="{775D1C29-7B88-46A3-9FAD-95EFDC006E81}"/>
-    <dgm:cxn modelId="{B0853F4E-0D10-4453-BA0F-87D700E6FDEE}" type="presOf" srcId="{7E2B8B4E-293F-43EE-AB7D-6598814ECB3C}" destId="{B3F8C3C3-65FB-486F-82C0-A8478B7022B9}" srcOrd="0" destOrd="0" presId="urn:microsoft.com/office/officeart/2005/8/layout/radial6"/>
-    <dgm:cxn modelId="{F68BA8B4-E5E5-4A12-9338-5CF5693ADCA2}" srcId="{B8060F7B-9920-4F24-BE71-F0E4E3B7B934}" destId="{AA38CBC9-AC6B-457D-9F63-4D1AB8E7793E}" srcOrd="0" destOrd="0" parTransId="{02DFC051-974F-4AF1-85DB-FFF5F1CCD57A}" sibTransId="{7ACF197E-8A7D-4D14-A941-EE15BE87306C}"/>
-    <dgm:cxn modelId="{3E929F04-D66A-4ADD-A218-BA7B4D2C65EC}" type="presOf" srcId="{B04B74A7-039D-46F2-A30E-0D07E04CAE1A}" destId="{53B5DF5F-8B8B-41EF-8531-276CBECDCAB4}" srcOrd="0" destOrd="0" presId="urn:microsoft.com/office/officeart/2005/8/layout/radial6"/>
-    <dgm:cxn modelId="{18D120E8-5826-42E7-A890-F4AFB63D3D78}" srcId="{AA38CBC9-AC6B-457D-9F63-4D1AB8E7793E}" destId="{7E2B8B4E-293F-43EE-AB7D-6598814ECB3C}" srcOrd="3" destOrd="0" parTransId="{C9A52CF1-B2E8-4848-8964-6633294F16CC}" sibTransId="{03860152-2A6F-476F-91FD-CBA9D7B26338}"/>
-    <dgm:cxn modelId="{D34E2ED8-ECCD-4FDF-AE76-C792B052F77C}" type="presOf" srcId="{5C1F42F6-070E-4EBA-8EBC-C32D27C49363}" destId="{22CB3940-637A-4C32-AB7F-CFAD929A59AB}" srcOrd="0" destOrd="0" presId="urn:microsoft.com/office/officeart/2005/8/layout/radial6"/>
     <dgm:cxn modelId="{F8374B3E-B514-46DF-94C4-AF94CDD1D72A}" type="presParOf" srcId="{B0C37B97-914B-49F2-84E5-94B39EF2352F}" destId="{D2BB9C9C-582A-4226-99A2-A6A4B7AD887A}" srcOrd="0" destOrd="0" presId="urn:microsoft.com/office/officeart/2005/8/layout/radial6"/>
     <dgm:cxn modelId="{B24EE426-834F-4DD6-9375-8641C6E734A6}" type="presParOf" srcId="{B0C37B97-914B-49F2-84E5-94B39EF2352F}" destId="{0B9D5D8D-AE9B-4E3C-8081-7E5A4C702F02}" srcOrd="1" destOrd="0" presId="urn:microsoft.com/office/officeart/2005/8/layout/radial6"/>
     <dgm:cxn modelId="{57EC5C98-3760-48A4-BD0C-E28EDE5F22FF}" type="presParOf" srcId="{B0C37B97-914B-49F2-84E5-94B39EF2352F}" destId="{E8755371-EE00-4D9C-9546-B5D2DEB3691D}" srcOrd="2" destOrd="0" presId="urn:microsoft.com/office/officeart/2005/8/layout/radial6"/>
@@ -1496,606 +1495,6 @@
       <dsp:cNvGrpSpPr/>
     </dsp:nvGrpSpPr>
     <dsp:grpSpPr/>
-    <dsp:sp modelId="{FADEA337-AD34-4422-B53A-01423AF1AC8F}">
-      <dsp:nvSpPr>
-        <dsp:cNvPr id="0" name=""/>
-        <dsp:cNvSpPr/>
-      </dsp:nvSpPr>
-      <dsp:spPr>
-        <a:xfrm>
-          <a:off x="514115" y="483158"/>
-          <a:ext cx="3224682" cy="3224682"/>
-        </a:xfrm>
-        <a:prstGeom prst="blockArc">
-          <a:avLst>
-            <a:gd name="adj1" fmla="val 10800000"/>
-            <a:gd name="adj2" fmla="val 16200000"/>
-            <a:gd name="adj3" fmla="val 4635"/>
-          </a:avLst>
-        </a:prstGeom>
-        <a:solidFill>
-          <a:schemeClr val="accent5">
-            <a:hueOff val="0"/>
-            <a:satOff val="0"/>
-            <a:lumOff val="0"/>
-            <a:alphaOff val="0"/>
-          </a:schemeClr>
-        </a:solidFill>
-        <a:ln>
-          <a:noFill/>
-        </a:ln>
-        <a:effectLst/>
-      </dsp:spPr>
-      <dsp:style>
-        <a:lnRef idx="0">
-          <a:scrgbClr r="0" g="0" b="0"/>
-        </a:lnRef>
-        <a:fillRef idx="1">
-          <a:scrgbClr r="0" g="0" b="0"/>
-        </a:fillRef>
-        <a:effectRef idx="0">
-          <a:scrgbClr r="0" g="0" b="0"/>
-        </a:effectRef>
-        <a:fontRef idx="minor">
-          <a:schemeClr val="lt1"/>
-        </a:fontRef>
-      </dsp:style>
-    </dsp:sp>
-    <dsp:sp modelId="{53B5DF5F-8B8B-41EF-8531-276CBECDCAB4}">
-      <dsp:nvSpPr>
-        <dsp:cNvPr id="0" name=""/>
-        <dsp:cNvSpPr/>
-      </dsp:nvSpPr>
-      <dsp:spPr>
-        <a:xfrm>
-          <a:off x="514115" y="483158"/>
-          <a:ext cx="3224682" cy="3224682"/>
-        </a:xfrm>
-        <a:prstGeom prst="blockArc">
-          <a:avLst>
-            <a:gd name="adj1" fmla="val 5400000"/>
-            <a:gd name="adj2" fmla="val 10800000"/>
-            <a:gd name="adj3" fmla="val 4635"/>
-          </a:avLst>
-        </a:prstGeom>
-        <a:solidFill>
-          <a:schemeClr val="accent4">
-            <a:hueOff val="0"/>
-            <a:satOff val="0"/>
-            <a:lumOff val="0"/>
-            <a:alphaOff val="0"/>
-          </a:schemeClr>
-        </a:solidFill>
-        <a:ln>
-          <a:noFill/>
-        </a:ln>
-        <a:effectLst/>
-      </dsp:spPr>
-      <dsp:style>
-        <a:lnRef idx="0">
-          <a:scrgbClr r="0" g="0" b="0"/>
-        </a:lnRef>
-        <a:fillRef idx="1">
-          <a:scrgbClr r="0" g="0" b="0"/>
-        </a:fillRef>
-        <a:effectRef idx="0">
-          <a:scrgbClr r="0" g="0" b="0"/>
-        </a:effectRef>
-        <a:fontRef idx="minor">
-          <a:schemeClr val="lt1"/>
-        </a:fontRef>
-      </dsp:style>
-    </dsp:sp>
-    <dsp:sp modelId="{22CB3940-637A-4C32-AB7F-CFAD929A59AB}">
-      <dsp:nvSpPr>
-        <dsp:cNvPr id="0" name=""/>
-        <dsp:cNvSpPr/>
-      </dsp:nvSpPr>
-      <dsp:spPr>
-        <a:xfrm>
-          <a:off x="514115" y="483158"/>
-          <a:ext cx="3224682" cy="3224682"/>
-        </a:xfrm>
-        <a:prstGeom prst="blockArc">
-          <a:avLst>
-            <a:gd name="adj1" fmla="val 0"/>
-            <a:gd name="adj2" fmla="val 5400000"/>
-            <a:gd name="adj3" fmla="val 4635"/>
-          </a:avLst>
-        </a:prstGeom>
-        <a:solidFill>
-          <a:schemeClr val="accent3">
-            <a:hueOff val="0"/>
-            <a:satOff val="0"/>
-            <a:lumOff val="0"/>
-            <a:alphaOff val="0"/>
-          </a:schemeClr>
-        </a:solidFill>
-        <a:ln>
-          <a:noFill/>
-        </a:ln>
-        <a:effectLst/>
-      </dsp:spPr>
-      <dsp:style>
-        <a:lnRef idx="0">
-          <a:scrgbClr r="0" g="0" b="0"/>
-        </a:lnRef>
-        <a:fillRef idx="1">
-          <a:scrgbClr r="0" g="0" b="0"/>
-        </a:fillRef>
-        <a:effectRef idx="0">
-          <a:scrgbClr r="0" g="0" b="0"/>
-        </a:effectRef>
-        <a:fontRef idx="minor">
-          <a:schemeClr val="lt1"/>
-        </a:fontRef>
-      </dsp:style>
-    </dsp:sp>
-    <dsp:sp modelId="{65DE7562-7D1C-4B0F-8927-12F8E6C5F5AF}">
-      <dsp:nvSpPr>
-        <dsp:cNvPr id="0" name=""/>
-        <dsp:cNvSpPr/>
-      </dsp:nvSpPr>
-      <dsp:spPr>
-        <a:xfrm>
-          <a:off x="514115" y="483158"/>
-          <a:ext cx="3224682" cy="3224682"/>
-        </a:xfrm>
-        <a:prstGeom prst="blockArc">
-          <a:avLst>
-            <a:gd name="adj1" fmla="val 16200000"/>
-            <a:gd name="adj2" fmla="val 0"/>
-            <a:gd name="adj3" fmla="val 4635"/>
-          </a:avLst>
-        </a:prstGeom>
-        <a:solidFill>
-          <a:schemeClr val="accent2">
-            <a:hueOff val="0"/>
-            <a:satOff val="0"/>
-            <a:lumOff val="0"/>
-            <a:alphaOff val="0"/>
-          </a:schemeClr>
-        </a:solidFill>
-        <a:ln>
-          <a:noFill/>
-        </a:ln>
-        <a:effectLst/>
-      </dsp:spPr>
-      <dsp:style>
-        <a:lnRef idx="0">
-          <a:scrgbClr r="0" g="0" b="0"/>
-        </a:lnRef>
-        <a:fillRef idx="1">
-          <a:scrgbClr r="0" g="0" b="0"/>
-        </a:fillRef>
-        <a:effectRef idx="0">
-          <a:scrgbClr r="0" g="0" b="0"/>
-        </a:effectRef>
-        <a:fontRef idx="minor">
-          <a:schemeClr val="lt1"/>
-        </a:fontRef>
-      </dsp:style>
-    </dsp:sp>
-    <dsp:sp modelId="{D2BB9C9C-582A-4226-99A2-A6A4B7AD887A}">
-      <dsp:nvSpPr>
-        <dsp:cNvPr id="0" name=""/>
-        <dsp:cNvSpPr/>
-      </dsp:nvSpPr>
-      <dsp:spPr>
-        <a:xfrm>
-          <a:off x="1385103" y="1354147"/>
-          <a:ext cx="1482705" cy="1482705"/>
-        </a:xfrm>
-        <a:prstGeom prst="ellipse">
-          <a:avLst/>
-        </a:prstGeom>
-        <a:solidFill>
-          <a:schemeClr val="accent1">
-            <a:hueOff val="0"/>
-            <a:satOff val="0"/>
-            <a:lumOff val="0"/>
-            <a:alphaOff val="0"/>
-          </a:schemeClr>
-        </a:solidFill>
-        <a:ln w="12700" cap="flat" cmpd="sng" algn="ctr">
-          <a:solidFill>
-            <a:schemeClr val="lt1">
-              <a:hueOff val="0"/>
-              <a:satOff val="0"/>
-              <a:lumOff val="0"/>
-              <a:alphaOff val="0"/>
-            </a:schemeClr>
-          </a:solidFill>
-          <a:prstDash val="solid"/>
-          <a:miter lim="800000"/>
-        </a:ln>
-        <a:effectLst/>
-      </dsp:spPr>
-      <dsp:style>
-        <a:lnRef idx="2">
-          <a:scrgbClr r="0" g="0" b="0"/>
-        </a:lnRef>
-        <a:fillRef idx="1">
-          <a:scrgbClr r="0" g="0" b="0"/>
-        </a:fillRef>
-        <a:effectRef idx="0">
-          <a:scrgbClr r="0" g="0" b="0"/>
-        </a:effectRef>
-        <a:fontRef idx="minor">
-          <a:schemeClr val="lt1"/>
-        </a:fontRef>
-      </dsp:style>
-      <dsp:txBody>
-        <a:bodyPr spcFirstLastPara="0" vert="horz" wrap="square" lIns="39370" tIns="39370" rIns="39370" bIns="39370" numCol="1" spcCol="1270" anchor="ctr" anchorCtr="0">
-          <a:noAutofit/>
-        </a:bodyPr>
-        <a:lstStyle/>
-        <a:p>
-          <a:pPr lvl="0" algn="ctr" defTabSz="1377950">
-            <a:lnSpc>
-              <a:spcPct val="90000"/>
-            </a:lnSpc>
-            <a:spcBef>
-              <a:spcPct val="0"/>
-            </a:spcBef>
-            <a:spcAft>
-              <a:spcPct val="35000"/>
-            </a:spcAft>
-          </a:pPr>
-          <a:r>
-            <a:rPr lang="en-US" sz="3100" kern="1200" dirty="0" smtClean="0">
-              <a:latin typeface="Segoe UI" panose="020B0502040204020203" pitchFamily="34" charset="0"/>
-              <a:cs typeface="Segoe UI" panose="020B0502040204020203" pitchFamily="34" charset="0"/>
-            </a:rPr>
-            <a:t>C# 6.0</a:t>
-          </a:r>
-          <a:endParaRPr lang="en-US" sz="3100" kern="1200" dirty="0">
-            <a:latin typeface="Segoe UI" panose="020B0502040204020203" pitchFamily="34" charset="0"/>
-            <a:cs typeface="Segoe UI" panose="020B0502040204020203" pitchFamily="34" charset="0"/>
-          </a:endParaRPr>
-        </a:p>
-      </dsp:txBody>
-      <dsp:txXfrm>
-        <a:off x="1602240" y="1571284"/>
-        <a:ext cx="1048431" cy="1048431"/>
-      </dsp:txXfrm>
-    </dsp:sp>
-    <dsp:sp modelId="{0B9D5D8D-AE9B-4E3C-8081-7E5A4C702F02}">
-      <dsp:nvSpPr>
-        <dsp:cNvPr id="0" name=""/>
-        <dsp:cNvSpPr/>
-      </dsp:nvSpPr>
-      <dsp:spPr>
-        <a:xfrm>
-          <a:off x="1607509" y="1576"/>
-          <a:ext cx="1037893" cy="1037893"/>
-        </a:xfrm>
-        <a:prstGeom prst="ellipse">
-          <a:avLst/>
-        </a:prstGeom>
-        <a:solidFill>
-          <a:schemeClr val="accent2">
-            <a:hueOff val="0"/>
-            <a:satOff val="0"/>
-            <a:lumOff val="0"/>
-            <a:alphaOff val="0"/>
-          </a:schemeClr>
-        </a:solidFill>
-        <a:ln w="12700" cap="flat" cmpd="sng" algn="ctr">
-          <a:solidFill>
-            <a:schemeClr val="lt1">
-              <a:hueOff val="0"/>
-              <a:satOff val="0"/>
-              <a:lumOff val="0"/>
-              <a:alphaOff val="0"/>
-            </a:schemeClr>
-          </a:solidFill>
-          <a:prstDash val="solid"/>
-          <a:miter lim="800000"/>
-        </a:ln>
-        <a:effectLst/>
-      </dsp:spPr>
-      <dsp:style>
-        <a:lnRef idx="2">
-          <a:scrgbClr r="0" g="0" b="0"/>
-        </a:lnRef>
-        <a:fillRef idx="1">
-          <a:scrgbClr r="0" g="0" b="0"/>
-        </a:fillRef>
-        <a:effectRef idx="0">
-          <a:scrgbClr r="0" g="0" b="0"/>
-        </a:effectRef>
-        <a:fontRef idx="minor">
-          <a:schemeClr val="lt1"/>
-        </a:fontRef>
-      </dsp:style>
-      <dsp:txBody>
-        <a:bodyPr spcFirstLastPara="0" vert="horz" wrap="square" lIns="12700" tIns="12700" rIns="12700" bIns="12700" numCol="1" spcCol="1270" anchor="ctr" anchorCtr="0">
-          <a:noAutofit/>
-        </a:bodyPr>
-        <a:lstStyle/>
-        <a:p>
-          <a:pPr lvl="0" algn="ctr" defTabSz="444500">
-            <a:lnSpc>
-              <a:spcPct val="90000"/>
-            </a:lnSpc>
-            <a:spcBef>
-              <a:spcPct val="0"/>
-            </a:spcBef>
-            <a:spcAft>
-              <a:spcPct val="35000"/>
-            </a:spcAft>
-          </a:pPr>
-          <a:r>
-            <a:rPr lang="en-US" sz="1000" kern="1200" dirty="0" smtClean="0">
-              <a:latin typeface="Segoe UI" panose="020B0502040204020203" pitchFamily="34" charset="0"/>
-              <a:cs typeface="Segoe UI" panose="020B0502040204020203" pitchFamily="34" charset="0"/>
-            </a:rPr>
-            <a:t>Productivity</a:t>
-          </a:r>
-          <a:endParaRPr lang="en-US" sz="1000" kern="1200" dirty="0">
-            <a:latin typeface="Segoe UI" panose="020B0502040204020203" pitchFamily="34" charset="0"/>
-            <a:cs typeface="Segoe UI" panose="020B0502040204020203" pitchFamily="34" charset="0"/>
-          </a:endParaRPr>
-        </a:p>
-      </dsp:txBody>
-      <dsp:txXfrm>
-        <a:off x="1759505" y="153572"/>
-        <a:ext cx="733901" cy="733901"/>
-      </dsp:txXfrm>
-    </dsp:sp>
-    <dsp:sp modelId="{1C226D9E-C8BD-43C0-B5A7-66592C02513E}">
-      <dsp:nvSpPr>
-        <dsp:cNvPr id="0" name=""/>
-        <dsp:cNvSpPr/>
-      </dsp:nvSpPr>
-      <dsp:spPr>
-        <a:xfrm>
-          <a:off x="3182486" y="1576553"/>
-          <a:ext cx="1037893" cy="1037893"/>
-        </a:xfrm>
-        <a:prstGeom prst="ellipse">
-          <a:avLst/>
-        </a:prstGeom>
-        <a:solidFill>
-          <a:schemeClr val="accent3">
-            <a:hueOff val="0"/>
-            <a:satOff val="0"/>
-            <a:lumOff val="0"/>
-            <a:alphaOff val="0"/>
-          </a:schemeClr>
-        </a:solidFill>
-        <a:ln w="12700" cap="flat" cmpd="sng" algn="ctr">
-          <a:solidFill>
-            <a:schemeClr val="lt1">
-              <a:hueOff val="0"/>
-              <a:satOff val="0"/>
-              <a:lumOff val="0"/>
-              <a:alphaOff val="0"/>
-            </a:schemeClr>
-          </a:solidFill>
-          <a:prstDash val="solid"/>
-          <a:miter lim="800000"/>
-        </a:ln>
-        <a:effectLst/>
-      </dsp:spPr>
-      <dsp:style>
-        <a:lnRef idx="2">
-          <a:scrgbClr r="0" g="0" b="0"/>
-        </a:lnRef>
-        <a:fillRef idx="1">
-          <a:scrgbClr r="0" g="0" b="0"/>
-        </a:fillRef>
-        <a:effectRef idx="0">
-          <a:scrgbClr r="0" g="0" b="0"/>
-        </a:effectRef>
-        <a:fontRef idx="minor">
-          <a:schemeClr val="lt1"/>
-        </a:fontRef>
-      </dsp:style>
-      <dsp:txBody>
-        <a:bodyPr spcFirstLastPara="0" vert="horz" wrap="square" lIns="12700" tIns="12700" rIns="12700" bIns="12700" numCol="1" spcCol="1270" anchor="ctr" anchorCtr="0">
-          <a:noAutofit/>
-        </a:bodyPr>
-        <a:lstStyle/>
-        <a:p>
-          <a:pPr lvl="0" algn="ctr" defTabSz="444500">
-            <a:lnSpc>
-              <a:spcPct val="90000"/>
-            </a:lnSpc>
-            <a:spcBef>
-              <a:spcPct val="0"/>
-            </a:spcBef>
-            <a:spcAft>
-              <a:spcPct val="35000"/>
-            </a:spcAft>
-          </a:pPr>
-          <a:r>
-            <a:rPr lang="en-US" sz="1000" kern="1200" dirty="0" smtClean="0">
-              <a:latin typeface="Segoe UI" panose="020B0502040204020203" pitchFamily="34" charset="0"/>
-              <a:cs typeface="Segoe UI" panose="020B0502040204020203" pitchFamily="34" charset="0"/>
-            </a:rPr>
-            <a:t>Small Features</a:t>
-          </a:r>
-          <a:endParaRPr lang="en-US" sz="1000" kern="1200" dirty="0">
-            <a:latin typeface="Segoe UI" panose="020B0502040204020203" pitchFamily="34" charset="0"/>
-            <a:cs typeface="Segoe UI" panose="020B0502040204020203" pitchFamily="34" charset="0"/>
-          </a:endParaRPr>
-        </a:p>
-      </dsp:txBody>
-      <dsp:txXfrm>
-        <a:off x="3334482" y="1728549"/>
-        <a:ext cx="733901" cy="733901"/>
-      </dsp:txXfrm>
-    </dsp:sp>
-    <dsp:sp modelId="{29DFD080-5F1B-4B82-A3B2-DA9D6DF3694E}">
-      <dsp:nvSpPr>
-        <dsp:cNvPr id="0" name=""/>
-        <dsp:cNvSpPr/>
-      </dsp:nvSpPr>
-      <dsp:spPr>
-        <a:xfrm>
-          <a:off x="1607509" y="3151530"/>
-          <a:ext cx="1037893" cy="1037893"/>
-        </a:xfrm>
-        <a:prstGeom prst="ellipse">
-          <a:avLst/>
-        </a:prstGeom>
-        <a:solidFill>
-          <a:schemeClr val="accent4">
-            <a:hueOff val="0"/>
-            <a:satOff val="0"/>
-            <a:lumOff val="0"/>
-            <a:alphaOff val="0"/>
-          </a:schemeClr>
-        </a:solidFill>
-        <a:ln w="12700" cap="flat" cmpd="sng" algn="ctr">
-          <a:solidFill>
-            <a:schemeClr val="lt1">
-              <a:hueOff val="0"/>
-              <a:satOff val="0"/>
-              <a:lumOff val="0"/>
-              <a:alphaOff val="0"/>
-            </a:schemeClr>
-          </a:solidFill>
-          <a:prstDash val="solid"/>
-          <a:miter lim="800000"/>
-        </a:ln>
-        <a:effectLst/>
-      </dsp:spPr>
-      <dsp:style>
-        <a:lnRef idx="2">
-          <a:scrgbClr r="0" g="0" b="0"/>
-        </a:lnRef>
-        <a:fillRef idx="1">
-          <a:scrgbClr r="0" g="0" b="0"/>
-        </a:fillRef>
-        <a:effectRef idx="0">
-          <a:scrgbClr r="0" g="0" b="0"/>
-        </a:effectRef>
-        <a:fontRef idx="minor">
-          <a:schemeClr val="lt1"/>
-        </a:fontRef>
-      </dsp:style>
-      <dsp:txBody>
-        <a:bodyPr spcFirstLastPara="0" vert="horz" wrap="square" lIns="12700" tIns="12700" rIns="12700" bIns="12700" numCol="1" spcCol="1270" anchor="ctr" anchorCtr="0">
-          <a:noAutofit/>
-        </a:bodyPr>
-        <a:lstStyle/>
-        <a:p>
-          <a:pPr lvl="0" algn="ctr" defTabSz="444500">
-            <a:lnSpc>
-              <a:spcPct val="90000"/>
-            </a:lnSpc>
-            <a:spcBef>
-              <a:spcPct val="0"/>
-            </a:spcBef>
-            <a:spcAft>
-              <a:spcPct val="35000"/>
-            </a:spcAft>
-          </a:pPr>
-          <a:r>
-            <a:rPr lang="en-US" sz="1000" kern="1200" dirty="0" smtClean="0">
-              <a:latin typeface="Segoe UI" panose="020B0502040204020203" pitchFamily="34" charset="0"/>
-              <a:cs typeface="Segoe UI" panose="020B0502040204020203" pitchFamily="34" charset="0"/>
-            </a:rPr>
-            <a:t>Lots of Features</a:t>
-          </a:r>
-          <a:endParaRPr lang="en-US" sz="1000" kern="1200" dirty="0">
-            <a:latin typeface="Segoe UI" panose="020B0502040204020203" pitchFamily="34" charset="0"/>
-            <a:cs typeface="Segoe UI" panose="020B0502040204020203" pitchFamily="34" charset="0"/>
-          </a:endParaRPr>
-        </a:p>
-      </dsp:txBody>
-      <dsp:txXfrm>
-        <a:off x="1759505" y="3303526"/>
-        <a:ext cx="733901" cy="733901"/>
-      </dsp:txXfrm>
-    </dsp:sp>
-    <dsp:sp modelId="{B3F8C3C3-65FB-486F-82C0-A8478B7022B9}">
-      <dsp:nvSpPr>
-        <dsp:cNvPr id="0" name=""/>
-        <dsp:cNvSpPr/>
-      </dsp:nvSpPr>
-      <dsp:spPr>
-        <a:xfrm>
-          <a:off x="32532" y="1576553"/>
-          <a:ext cx="1037893" cy="1037893"/>
-        </a:xfrm>
-        <a:prstGeom prst="ellipse">
-          <a:avLst/>
-        </a:prstGeom>
-        <a:solidFill>
-          <a:schemeClr val="accent5">
-            <a:hueOff val="0"/>
-            <a:satOff val="0"/>
-            <a:lumOff val="0"/>
-            <a:alphaOff val="0"/>
-          </a:schemeClr>
-        </a:solidFill>
-        <a:ln w="12700" cap="flat" cmpd="sng" algn="ctr">
-          <a:solidFill>
-            <a:schemeClr val="lt1">
-              <a:hueOff val="0"/>
-              <a:satOff val="0"/>
-              <a:lumOff val="0"/>
-              <a:alphaOff val="0"/>
-            </a:schemeClr>
-          </a:solidFill>
-          <a:prstDash val="solid"/>
-          <a:miter lim="800000"/>
-        </a:ln>
-        <a:effectLst/>
-      </dsp:spPr>
-      <dsp:style>
-        <a:lnRef idx="2">
-          <a:scrgbClr r="0" g="0" b="0"/>
-        </a:lnRef>
-        <a:fillRef idx="1">
-          <a:scrgbClr r="0" g="0" b="0"/>
-        </a:fillRef>
-        <a:effectRef idx="0">
-          <a:scrgbClr r="0" g="0" b="0"/>
-        </a:effectRef>
-        <a:fontRef idx="minor">
-          <a:schemeClr val="lt1"/>
-        </a:fontRef>
-      </dsp:style>
-      <dsp:txBody>
-        <a:bodyPr spcFirstLastPara="0" vert="horz" wrap="square" lIns="12700" tIns="12700" rIns="12700" bIns="12700" numCol="1" spcCol="1270" anchor="ctr" anchorCtr="0">
-          <a:noAutofit/>
-        </a:bodyPr>
-        <a:lstStyle/>
-        <a:p>
-          <a:pPr lvl="0" algn="ctr" defTabSz="444500">
-            <a:lnSpc>
-              <a:spcPct val="90000"/>
-            </a:lnSpc>
-            <a:spcBef>
-              <a:spcPct val="0"/>
-            </a:spcBef>
-            <a:spcAft>
-              <a:spcPct val="35000"/>
-            </a:spcAft>
-          </a:pPr>
-          <a:r>
-            <a:rPr lang="en-US" sz="1000" kern="1200" dirty="0" smtClean="0">
-              <a:latin typeface="Segoe UI" panose="020B0502040204020203" pitchFamily="34" charset="0"/>
-              <a:cs typeface="Segoe UI" panose="020B0502040204020203" pitchFamily="34" charset="0"/>
-            </a:rPr>
-            <a:t>Concise and Clear</a:t>
-          </a:r>
-          <a:endParaRPr lang="en-US" sz="1000" kern="1200" dirty="0">
-            <a:latin typeface="Segoe UI" panose="020B0502040204020203" pitchFamily="34" charset="0"/>
-            <a:cs typeface="Segoe UI" panose="020B0502040204020203" pitchFamily="34" charset="0"/>
-          </a:endParaRPr>
-        </a:p>
-      </dsp:txBody>
-      <dsp:txXfrm>
-        <a:off x="184528" y="1728549"/>
-        <a:ext cx="733901" cy="733901"/>
-      </dsp:txXfrm>
-    </dsp:sp>
   </dsp:spTree>
 </dsp:drawing>
 </file>
@@ -3623,7 +3022,7 @@
           <a:p>
             <a:fld id="{24CE221E-83ED-4F6C-BA5F-3F9E6FDB6953}" type="datetimeFigureOut">
               <a:rPr lang="en-US"/>
-              <a:t>1/22/2015</a:t>
+              <a:t>2/27/2015</a:t>
             </a:fld>
             <a:endParaRPr/>
           </a:p>
@@ -3788,7 +3187,7 @@
           <a:p>
             <a:fld id="{97853E5F-CE67-483C-A264-F17AC70E9CA2}" type="datetimeFigureOut">
               <a:rPr lang="en-US"/>
-              <a:t>1/22/2015</a:t>
+              <a:t>2/27/2015</a:t>
             </a:fld>
             <a:endParaRPr/>
           </a:p>
@@ -4682,7 +4081,7 @@
           <a:p>
             <a:fld id="{3E0FA9E5-6744-4841-888F-9E7CC0C2B7EC}" type="datetimeFigureOut">
               <a:rPr lang="en-US"/>
-              <a:t>1/22/2015</a:t>
+              <a:t>2/27/2015</a:t>
             </a:fld>
             <a:endParaRPr/>
           </a:p>
@@ -4871,7 +4270,7 @@
           <a:p>
             <a:fld id="{3E0FA9E5-6744-4841-888F-9E7CC0C2B7EC}" type="datetimeFigureOut">
               <a:rPr lang="en-US"/>
-              <a:t>1/22/2015</a:t>
+              <a:t>2/27/2015</a:t>
             </a:fld>
             <a:endParaRPr/>
           </a:p>
@@ -5070,7 +4469,7 @@
           <a:p>
             <a:fld id="{3E0FA9E5-6744-4841-888F-9E7CC0C2B7EC}" type="datetimeFigureOut">
               <a:rPr lang="en-US"/>
-              <a:t>1/22/2015</a:t>
+              <a:t>2/27/2015</a:t>
             </a:fld>
             <a:endParaRPr/>
           </a:p>
@@ -5259,7 +4658,7 @@
           <a:p>
             <a:fld id="{3E0FA9E5-6744-4841-888F-9E7CC0C2B7EC}" type="datetimeFigureOut">
               <a:rPr lang="en-US"/>
-              <a:t>1/22/2015</a:t>
+              <a:t>2/27/2015</a:t>
             </a:fld>
             <a:endParaRPr/>
           </a:p>
@@ -5546,7 +4945,7 @@
           <a:p>
             <a:fld id="{3E0FA9E5-6744-4841-888F-9E7CC0C2B7EC}" type="datetimeFigureOut">
               <a:rPr lang="en-US"/>
-              <a:t>1/22/2015</a:t>
+              <a:t>2/27/2015</a:t>
             </a:fld>
             <a:endParaRPr/>
           </a:p>
@@ -5857,7 +5256,7 @@
           <a:p>
             <a:fld id="{3E0FA9E5-6744-4841-888F-9E7CC0C2B7EC}" type="datetimeFigureOut">
               <a:rPr lang="en-US"/>
-              <a:t>1/22/2015</a:t>
+              <a:t>2/27/2015</a:t>
             </a:fld>
             <a:endParaRPr/>
           </a:p>
@@ -6312,7 +5711,7 @@
           <a:p>
             <a:fld id="{3E0FA9E5-6744-4841-888F-9E7CC0C2B7EC}" type="datetimeFigureOut">
               <a:rPr lang="en-US"/>
-              <a:t>1/22/2015</a:t>
+              <a:t>2/27/2015</a:t>
             </a:fld>
             <a:endParaRPr/>
           </a:p>
@@ -6449,7 +5848,7 @@
           <a:p>
             <a:fld id="{3E0FA9E5-6744-4841-888F-9E7CC0C2B7EC}" type="datetimeFigureOut">
               <a:rPr lang="en-US"/>
-              <a:t>1/22/2015</a:t>
+              <a:t>2/27/2015</a:t>
             </a:fld>
             <a:endParaRPr/>
           </a:p>
@@ -6577,7 +5976,7 @@
           <a:p>
             <a:fld id="{3E0FA9E5-6744-4841-888F-9E7CC0C2B7EC}" type="datetimeFigureOut">
               <a:rPr lang="en-US"/>
-              <a:t>1/22/2015</a:t>
+              <a:t>2/27/2015</a:t>
             </a:fld>
             <a:endParaRPr/>
           </a:p>
@@ -6906,7 +6305,7 @@
           <a:p>
             <a:fld id="{3E0FA9E5-6744-4841-888F-9E7CC0C2B7EC}" type="datetimeFigureOut">
               <a:rPr lang="en-US"/>
-              <a:t>1/22/2015</a:t>
+              <a:t>2/27/2015</a:t>
             </a:fld>
             <a:endParaRPr/>
           </a:p>
@@ -7395,7 +6794,7 @@
             <a:fld id="{3E0FA9E5-6744-4841-888F-9E7CC0C2B7EC}" type="datetimeFigureOut">
               <a:rPr lang="en-US"/>
               <a:pPr/>
-              <a:t>1/22/2015</a:t>
+              <a:t>2/27/2015</a:t>
             </a:fld>
             <a:endParaRPr/>
           </a:p>
@@ -8640,29 +8039,51 @@
                 <a:ea typeface="Calibri" panose="020F0502020204030204" pitchFamily="34" charset="0"/>
                 <a:cs typeface="Consolas" panose="020B0609020204030204" pitchFamily="49" charset="0"/>
               </a:rPr>
-              <a:t> e) </a:t>
+              <a:t> e</a:t>
+            </a:r>
+            <a:r>
+              <a:rPr lang="en-US" sz="1800">
+                <a:solidFill>
+                  <a:srgbClr val="000000"/>
+                </a:solidFill>
+                <a:latin typeface="Consolas" panose="020B0609020204030204" pitchFamily="49" charset="0"/>
+                <a:ea typeface="Calibri" panose="020F0502020204030204" pitchFamily="34" charset="0"/>
+                <a:cs typeface="Consolas" panose="020B0609020204030204" pitchFamily="49" charset="0"/>
+              </a:rPr>
+              <a:t>) </a:t>
+            </a:r>
+            <a:r>
+              <a:rPr lang="en-US" sz="1800" smtClean="0">
+                <a:solidFill>
+                  <a:srgbClr val="0000FF"/>
+                </a:solidFill>
+                <a:latin typeface="Consolas" panose="020B0609020204030204" pitchFamily="49" charset="0"/>
+                <a:ea typeface="Calibri" panose="020F0502020204030204" pitchFamily="34" charset="0"/>
+                <a:cs typeface="Consolas" panose="020B0609020204030204" pitchFamily="49" charset="0"/>
+              </a:rPr>
+              <a:t>when</a:t>
+            </a:r>
+            <a:r>
+              <a:rPr lang="en-US" sz="1800" smtClean="0">
+                <a:solidFill>
+                  <a:srgbClr val="000000"/>
+                </a:solidFill>
+                <a:latin typeface="Consolas" panose="020B0609020204030204" pitchFamily="49" charset="0"/>
+                <a:ea typeface="Calibri" panose="020F0502020204030204" pitchFamily="34" charset="0"/>
+                <a:cs typeface="Consolas" panose="020B0609020204030204" pitchFamily="49" charset="0"/>
+              </a:rPr>
+              <a:t> </a:t>
             </a:r>
             <a:r>
               <a:rPr lang="en-US" sz="1800" dirty="0">
                 <a:solidFill>
-                  <a:srgbClr val="0000FF"/>
-                </a:solidFill>
-                <a:latin typeface="Consolas" panose="020B0609020204030204" pitchFamily="49" charset="0"/>
-                <a:ea typeface="Calibri" panose="020F0502020204030204" pitchFamily="34" charset="0"/>
-                <a:cs typeface="Consolas" panose="020B0609020204030204" pitchFamily="49" charset="0"/>
-              </a:rPr>
-              <a:t>if</a:t>
-            </a:r>
-            <a:r>
-              <a:rPr lang="en-US" sz="1800" dirty="0">
-                <a:solidFill>
-                  <a:srgbClr val="000000"/>
-                </a:solidFill>
-                <a:latin typeface="Consolas" panose="020B0609020204030204" pitchFamily="49" charset="0"/>
-                <a:ea typeface="Calibri" panose="020F0502020204030204" pitchFamily="34" charset="0"/>
-                <a:cs typeface="Consolas" panose="020B0609020204030204" pitchFamily="49" charset="0"/>
-              </a:rPr>
-              <a:t> (failures++ &lt; 10)</a:t>
+                  <a:srgbClr val="000000"/>
+                </a:solidFill>
+                <a:latin typeface="Consolas" panose="020B0609020204030204" pitchFamily="49" charset="0"/>
+                <a:ea typeface="Calibri" panose="020F0502020204030204" pitchFamily="34" charset="0"/>
+                <a:cs typeface="Consolas" panose="020B0609020204030204" pitchFamily="49" charset="0"/>
+              </a:rPr>
+              <a:t>(failures++ &lt; 10)</a:t>
             </a:r>
             <a:endParaRPr lang="en-US" sz="1800" dirty="0">
               <a:latin typeface="Consolas" panose="020B0609020204030204" pitchFamily="49" charset="0"/>
@@ -9664,26 +9085,37 @@
               <a:t> e) </a:t>
             </a:r>
             <a:r>
+              <a:rPr lang="en-US" sz="1800" dirty="0" smtClean="0">
+                <a:solidFill>
+                  <a:srgbClr val="0000FF"/>
+                </a:solidFill>
+                <a:latin typeface="Consolas" panose="020B0609020204030204" pitchFamily="49" charset="0"/>
+                <a:ea typeface="Calibri" panose="020F0502020204030204" pitchFamily="34" charset="0"/>
+                <a:cs typeface="Consolas" panose="020B0609020204030204" pitchFamily="49" charset="0"/>
+              </a:rPr>
+              <a:t>when</a:t>
+            </a:r>
+            <a:r>
+              <a:rPr lang="en-US" sz="1800" dirty="0" smtClean="0">
+                <a:solidFill>
+                  <a:srgbClr val="000000"/>
+                </a:solidFill>
+                <a:latin typeface="Consolas" panose="020B0609020204030204" pitchFamily="49" charset="0"/>
+                <a:ea typeface="Calibri" panose="020F0502020204030204" pitchFamily="34" charset="0"/>
+                <a:cs typeface="Consolas" panose="020B0609020204030204" pitchFamily="49" charset="0"/>
+              </a:rPr>
+              <a:t> </a:t>
+            </a:r>
+            <a:r>
               <a:rPr lang="en-US" sz="1800" dirty="0">
                 <a:solidFill>
-                  <a:srgbClr val="0000FF"/>
-                </a:solidFill>
-                <a:latin typeface="Consolas" panose="020B0609020204030204" pitchFamily="49" charset="0"/>
-                <a:ea typeface="Calibri" panose="020F0502020204030204" pitchFamily="34" charset="0"/>
-                <a:cs typeface="Consolas" panose="020B0609020204030204" pitchFamily="49" charset="0"/>
-              </a:rPr>
-              <a:t>if</a:t>
-            </a:r>
-            <a:r>
-              <a:rPr lang="en-US" sz="1800" dirty="0">
-                <a:solidFill>
-                  <a:srgbClr val="000000"/>
-                </a:solidFill>
-                <a:latin typeface="Consolas" panose="020B0609020204030204" pitchFamily="49" charset="0"/>
-                <a:ea typeface="Calibri" panose="020F0502020204030204" pitchFamily="34" charset="0"/>
-                <a:cs typeface="Consolas" panose="020B0609020204030204" pitchFamily="49" charset="0"/>
-              </a:rPr>
-              <a:t> (</a:t>
+                  <a:srgbClr val="000000"/>
+                </a:solidFill>
+                <a:latin typeface="Consolas" panose="020B0609020204030204" pitchFamily="49" charset="0"/>
+                <a:ea typeface="Calibri" panose="020F0502020204030204" pitchFamily="34" charset="0"/>
+                <a:cs typeface="Consolas" panose="020B0609020204030204" pitchFamily="49" charset="0"/>
+              </a:rPr>
+              <a:t>(</a:t>
             </a:r>
             <a:r>
               <a:rPr lang="en-US" sz="1800" dirty="0" err="1">
@@ -11770,26 +11202,37 @@
               <a:t> e) </a:t>
             </a:r>
             <a:r>
+              <a:rPr lang="en-US" sz="1800" dirty="0" smtClean="0">
+                <a:solidFill>
+                  <a:srgbClr val="0000FF"/>
+                </a:solidFill>
+                <a:latin typeface="Consolas" panose="020B0609020204030204" pitchFamily="49" charset="0"/>
+                <a:ea typeface="Calibri" panose="020F0502020204030204" pitchFamily="34" charset="0"/>
+                <a:cs typeface="Consolas" panose="020B0609020204030204" pitchFamily="49" charset="0"/>
+              </a:rPr>
+              <a:t>when</a:t>
+            </a:r>
+            <a:r>
+              <a:rPr lang="en-US" sz="1800" dirty="0" smtClean="0">
+                <a:solidFill>
+                  <a:srgbClr val="000000"/>
+                </a:solidFill>
+                <a:latin typeface="Consolas" panose="020B0609020204030204" pitchFamily="49" charset="0"/>
+                <a:ea typeface="Calibri" panose="020F0502020204030204" pitchFamily="34" charset="0"/>
+                <a:cs typeface="Consolas" panose="020B0609020204030204" pitchFamily="49" charset="0"/>
+              </a:rPr>
+              <a:t> </a:t>
+            </a:r>
+            <a:r>
               <a:rPr lang="en-US" sz="1800" dirty="0">
                 <a:solidFill>
-                  <a:srgbClr val="0000FF"/>
-                </a:solidFill>
-                <a:latin typeface="Consolas" panose="020B0609020204030204" pitchFamily="49" charset="0"/>
-                <a:ea typeface="Calibri" panose="020F0502020204030204" pitchFamily="34" charset="0"/>
-                <a:cs typeface="Consolas" panose="020B0609020204030204" pitchFamily="49" charset="0"/>
-              </a:rPr>
-              <a:t>if</a:t>
-            </a:r>
-            <a:r>
-              <a:rPr lang="en-US" sz="1800" dirty="0">
-                <a:solidFill>
-                  <a:srgbClr val="000000"/>
-                </a:solidFill>
-                <a:latin typeface="Consolas" panose="020B0609020204030204" pitchFamily="49" charset="0"/>
-                <a:ea typeface="Calibri" panose="020F0502020204030204" pitchFamily="34" charset="0"/>
-                <a:cs typeface="Consolas" panose="020B0609020204030204" pitchFamily="49" charset="0"/>
-              </a:rPr>
-              <a:t> ((failures++ &lt; 10) </a:t>
+                  <a:srgbClr val="000000"/>
+                </a:solidFill>
+                <a:latin typeface="Consolas" panose="020B0609020204030204" pitchFamily="49" charset="0"/>
+                <a:ea typeface="Calibri" panose="020F0502020204030204" pitchFamily="34" charset="0"/>
+                <a:cs typeface="Consolas" panose="020B0609020204030204" pitchFamily="49" charset="0"/>
+              </a:rPr>
+              <a:t>((failures++ &lt; 10) </a:t>
             </a:r>
             <a:r>
               <a:rPr lang="en-US" sz="1800" dirty="0" smtClean="0">
@@ -12146,127 +11589,6 @@
       </p:grpSpPr>
       <p:sp>
         <p:nvSpPr>
-          <p:cNvPr id="2" name="Title 1"/>
-          <p:cNvSpPr>
-            <a:spLocks noGrp="1"/>
-          </p:cNvSpPr>
-          <p:nvPr>
-            <p:ph type="title"/>
-          </p:nvPr>
-        </p:nvSpPr>
-        <p:spPr/>
-        <p:txBody>
-          <a:bodyPr/>
-          <a:lstStyle/>
-          <a:p>
-            <a:r>
-              <a:rPr lang="en-US" dirty="0" smtClean="0"/>
-              <a:t>Exception Filters: when vs. is</a:t>
-            </a:r>
-            <a:endParaRPr lang="en-US" dirty="0"/>
-          </a:p>
-        </p:txBody>
-      </p:sp>
-      <p:sp>
-        <p:nvSpPr>
-          <p:cNvPr id="3" name="Content Placeholder 2"/>
-          <p:cNvSpPr>
-            <a:spLocks noGrp="1"/>
-          </p:cNvSpPr>
-          <p:nvPr>
-            <p:ph idx="1"/>
-          </p:nvPr>
-        </p:nvSpPr>
-        <p:spPr/>
-        <p:txBody>
-          <a:bodyPr/>
-          <a:lstStyle/>
-          <a:p>
-            <a:endParaRPr lang="en-US"/>
-          </a:p>
-        </p:txBody>
-      </p:sp>
-      <p:pic>
-        <p:nvPicPr>
-          <p:cNvPr id="4" name="Picture 3"/>
-          <p:cNvPicPr>
-            <a:picLocks noChangeAspect="1"/>
-          </p:cNvPicPr>
-          <p:nvPr/>
-        </p:nvPicPr>
-        <p:blipFill>
-          <a:blip r:embed="rId2">
-            <a:extLst>
-              <a:ext uri="{28A0092B-C50C-407E-A947-70E740481C1C}">
-                <a14:useLocalDpi xmlns:a14="http://schemas.microsoft.com/office/drawing/2010/main" val="0"/>
-              </a:ext>
-            </a:extLst>
-          </a:blip>
-          <a:stretch>
-            <a:fillRect/>
-          </a:stretch>
-        </p:blipFill>
-        <p:spPr>
-          <a:xfrm>
-            <a:off x="1065212" y="1524000"/>
-            <a:ext cx="8229600" cy="5191125"/>
-          </a:xfrm>
-          <a:prstGeom prst="rect">
-            <a:avLst/>
-          </a:prstGeom>
-        </p:spPr>
-      </p:pic>
-    </p:spTree>
-    <p:extLst>
-      <p:ext uri="{BB962C8B-B14F-4D97-AF65-F5344CB8AC3E}">
-        <p14:creationId xmlns:p14="http://schemas.microsoft.com/office/powerpoint/2010/main" val="923795114"/>
-      </p:ext>
-    </p:extLst>
-  </p:cSld>
-  <p:clrMapOvr>
-    <a:masterClrMapping/>
-  </p:clrMapOvr>
-  <mc:AlternateContent xmlns:mc="http://schemas.openxmlformats.org/markup-compatibility/2006" xmlns:p14="http://schemas.microsoft.com/office/powerpoint/2010/main">
-    <mc:Choice Requires="p14">
-      <p:transition spd="med" p14:dur="700">
-        <p:fade/>
-      </p:transition>
-    </mc:Choice>
-    <mc:Fallback xmlns="">
-      <p:transition spd="med">
-        <p:fade/>
-      </p:transition>
-    </mc:Fallback>
-  </mc:AlternateContent>
-  <p:timing>
-    <p:tnLst>
-      <p:par>
-        <p:cTn id="1" dur="indefinite" restart="never" nodeType="tmRoot"/>
-      </p:par>
-    </p:tnLst>
-  </p:timing>
-</p:sld>
-</file>
-
-<file path=ppt/slides/slide15.xml><?xml version="1.0" encoding="utf-8"?>
-<p:sld xmlns:a="http://schemas.openxmlformats.org/drawingml/2006/main" xmlns:r="http://schemas.openxmlformats.org/officeDocument/2006/relationships" xmlns:p="http://schemas.openxmlformats.org/presentationml/2006/main">
-  <p:cSld>
-    <p:spTree>
-      <p:nvGrpSpPr>
-        <p:cNvPr id="1" name=""/>
-        <p:cNvGrpSpPr/>
-        <p:nvPr/>
-      </p:nvGrpSpPr>
-      <p:grpSpPr>
-        <a:xfrm>
-          <a:off x="0" y="0"/>
-          <a:ext cx="0" cy="0"/>
-          <a:chOff x="0" y="0"/>
-          <a:chExt cx="0" cy="0"/>
-        </a:xfrm>
-      </p:grpSpPr>
-      <p:sp>
-        <p:nvSpPr>
           <p:cNvPr id="7" name="Rectangle 6"/>
           <p:cNvSpPr/>
           <p:nvPr/>
@@ -12457,21 +11779,7 @@
                 <a:latin typeface="Segoe UI" panose="020B0502040204020203" pitchFamily="34" charset="0"/>
                 <a:cs typeface="Segoe UI" panose="020B0502040204020203" pitchFamily="34" charset="0"/>
               </a:rPr>
-              <a:t>Null </a:t>
-            </a:r>
-            <a:r>
-              <a:rPr lang="en-US" dirty="0" smtClean="0">
-                <a:latin typeface="Segoe UI" panose="020B0502040204020203" pitchFamily="34" charset="0"/>
-                <a:cs typeface="Segoe UI" panose="020B0502040204020203" pitchFamily="34" charset="0"/>
-              </a:rPr>
-              <a:t>Conditional </a:t>
-            </a:r>
-            <a:r>
-              <a:rPr lang="en-US" dirty="0" smtClean="0">
-                <a:latin typeface="Segoe UI" panose="020B0502040204020203" pitchFamily="34" charset="0"/>
-                <a:cs typeface="Segoe UI" panose="020B0502040204020203" pitchFamily="34" charset="0"/>
-              </a:rPr>
-              <a:t>Operator</a:t>
+              <a:t>Null Conditional Operator</a:t>
             </a:r>
             <a:endParaRPr lang="en-US" dirty="0">
               <a:latin typeface="Segoe UI" panose="020B0502040204020203" pitchFamily="34" charset="0"/>
@@ -13914,7 +13222,7 @@
 </p:sld>
 </file>
 
-<file path=ppt/slides/slide16.xml><?xml version="1.0" encoding="utf-8"?>
+<file path=ppt/slides/slide15.xml><?xml version="1.0" encoding="utf-8"?>
 <p:sld xmlns:a="http://schemas.openxmlformats.org/drawingml/2006/main" xmlns:r="http://schemas.openxmlformats.org/officeDocument/2006/relationships" xmlns:p="http://schemas.openxmlformats.org/presentationml/2006/main">
   <p:cSld>
     <p:spTree>
@@ -14123,14 +13431,7 @@
                 <a:latin typeface="Segoe UI" panose="020B0502040204020203" pitchFamily="34" charset="0"/>
                 <a:cs typeface="Segoe UI" panose="020B0502040204020203" pitchFamily="34" charset="0"/>
               </a:rPr>
-              <a:t>Null </a:t>
-            </a:r>
-            <a:r>
-              <a:rPr lang="en-US" smtClean="0">
-                <a:latin typeface="Segoe UI" panose="020B0502040204020203" pitchFamily="34" charset="0"/>
-                <a:cs typeface="Segoe UI" panose="020B0502040204020203" pitchFamily="34" charset="0"/>
-              </a:rPr>
-              <a:t>Conditional Operator </a:t>
+              <a:t>Null Conditional Operator </a:t>
             </a:r>
             <a:r>
               <a:rPr lang="en-US" dirty="0" smtClean="0">
@@ -15026,7 +14327,7 @@
 </p:sld>
 </file>
 
-<file path=ppt/slides/slide17.xml><?xml version="1.0" encoding="utf-8"?>
+<file path=ppt/slides/slide16.xml><?xml version="1.0" encoding="utf-8"?>
 <p:sld xmlns:a="http://schemas.openxmlformats.org/drawingml/2006/main" xmlns:r="http://schemas.openxmlformats.org/officeDocument/2006/relationships" xmlns:p="http://schemas.openxmlformats.org/presentationml/2006/main">
   <p:cSld>
     <p:spTree>
@@ -16062,7 +15363,7 @@
 </p:sld>
 </file>
 
-<file path=ppt/slides/slide18.xml><?xml version="1.0" encoding="utf-8"?>
+<file path=ppt/slides/slide17.xml><?xml version="1.0" encoding="utf-8"?>
 <p:sld xmlns:a="http://schemas.openxmlformats.org/drawingml/2006/main" xmlns:r="http://schemas.openxmlformats.org/officeDocument/2006/relationships" xmlns:p="http://schemas.openxmlformats.org/presentationml/2006/main">
   <p:cSld>
     <p:spTree>
@@ -16197,7 +15498,7 @@
 </p:sld>
 </file>
 
-<file path=ppt/slides/slide19.xml><?xml version="1.0" encoding="utf-8"?>
+<file path=ppt/slides/slide18.xml><?xml version="1.0" encoding="utf-8"?>
 <p:sld xmlns:a="http://schemas.openxmlformats.org/drawingml/2006/main" xmlns:r="http://schemas.openxmlformats.org/officeDocument/2006/relationships" xmlns:p="http://schemas.openxmlformats.org/presentationml/2006/main">
   <p:cSld>
     <p:spTree>
@@ -19581,18 +18882,7 @@
                 <a:ea typeface="Calibri" panose="020F0502020204030204" pitchFamily="34" charset="0"/>
                 <a:cs typeface="Consolas" panose="020B0609020204030204" pitchFamily="49" charset="0"/>
               </a:rPr>
-              <a:t>sing </a:t>
-            </a:r>
-            <a:r>
-              <a:rPr lang="en-US" sz="1600" dirty="0" smtClean="0">
-                <a:solidFill>
-                  <a:srgbClr val="0000FF"/>
-                </a:solidFill>
-                <a:latin typeface="Consolas" panose="020B0609020204030204" pitchFamily="49" charset="0"/>
-                <a:ea typeface="Calibri" panose="020F0502020204030204" pitchFamily="34" charset="0"/>
-                <a:cs typeface="Consolas" panose="020B0609020204030204" pitchFamily="49" charset="0"/>
-              </a:rPr>
-              <a:t>static</a:t>
+              <a:t>sing static</a:t>
             </a:r>
             <a:r>
               <a:rPr lang="en-US" sz="1600" dirty="0" smtClean="0">

</xml_diff>